<commit_message>
fixed poster.pptx for marketing
</commit_message>
<xml_diff>
--- a/2017/keynote/poster.pptx
+++ b/2017/keynote/poster.pptx
@@ -5180,23 +5180,6 @@
               </a:rPr>
               <a:t>URL</a:t>
             </a:r>
-            <a:endParaRPr lang="en-US" altLang="ja-JP" sz="2000" b="1" dirty="0" smtClean="0">
-              <a:ln w="22225">
-                <a:solidFill>
-                  <a:schemeClr val="tx1">
-                    <a:lumMod val="85000"/>
-                    <a:lumOff val="15000"/>
-                  </a:schemeClr>
-                </a:solidFill>
-                <a:prstDash val="solid"/>
-              </a:ln>
-              <a:solidFill>
-                <a:schemeClr val="bg1"/>
-              </a:solidFill>
-              <a:latin typeface="Hiragino Kaku Gothic StdN W8" charset="-128"/>
-              <a:ea typeface="Hiragino Kaku Gothic StdN W8" charset="-128"/>
-              <a:cs typeface="Hiragino Kaku Gothic StdN W8" charset="-128"/>
-            </a:endParaRPr>
           </a:p>
         </p:txBody>
       </p:sp>
@@ -7335,23 +7318,6 @@
               </a:rPr>
               <a:t>URL</a:t>
             </a:r>
-            <a:endParaRPr lang="en-US" altLang="ja-JP" sz="2000" b="1" dirty="0" smtClean="0">
-              <a:ln w="22225">
-                <a:solidFill>
-                  <a:schemeClr val="tx1">
-                    <a:lumMod val="85000"/>
-                    <a:lumOff val="15000"/>
-                  </a:schemeClr>
-                </a:solidFill>
-                <a:prstDash val="solid"/>
-              </a:ln>
-              <a:solidFill>
-                <a:schemeClr val="bg1"/>
-              </a:solidFill>
-              <a:latin typeface="Hiragino Kaku Gothic StdN W8" charset="-128"/>
-              <a:ea typeface="Hiragino Kaku Gothic StdN W8" charset="-128"/>
-              <a:cs typeface="Hiragino Kaku Gothic StdN W8" charset="-128"/>
-            </a:endParaRPr>
           </a:p>
         </p:txBody>
       </p:sp>
@@ -9366,23 +9332,6 @@
               </a:rPr>
               <a:t>URL</a:t>
             </a:r>
-            <a:endParaRPr lang="en-US" altLang="ja-JP" sz="2400" b="1" dirty="0" smtClean="0">
-              <a:ln w="15875">
-                <a:solidFill>
-                  <a:schemeClr val="tx1">
-                    <a:lumMod val="85000"/>
-                    <a:lumOff val="15000"/>
-                  </a:schemeClr>
-                </a:solidFill>
-                <a:prstDash val="solid"/>
-              </a:ln>
-              <a:solidFill>
-                <a:schemeClr val="bg1"/>
-              </a:solidFill>
-              <a:latin typeface="Hiragino Kaku Gothic StdN W8" charset="-128"/>
-              <a:ea typeface="Hiragino Kaku Gothic StdN W8" charset="-128"/>
-              <a:cs typeface="Hiragino Kaku Gothic StdN W8" charset="-128"/>
-            </a:endParaRPr>
           </a:p>
         </p:txBody>
       </p:sp>
@@ -12063,23 +12012,6 @@
               </a:rPr>
               <a:t>URL</a:t>
             </a:r>
-            <a:endParaRPr lang="en-US" altLang="ja-JP" sz="2400" b="1" dirty="0" smtClean="0">
-              <a:ln w="15875">
-                <a:solidFill>
-                  <a:schemeClr val="tx1">
-                    <a:lumMod val="85000"/>
-                    <a:lumOff val="15000"/>
-                  </a:schemeClr>
-                </a:solidFill>
-                <a:prstDash val="solid"/>
-              </a:ln>
-              <a:solidFill>
-                <a:schemeClr val="bg1"/>
-              </a:solidFill>
-              <a:latin typeface="Hiragino Kaku Gothic StdN W8" charset="-128"/>
-              <a:ea typeface="Hiragino Kaku Gothic StdN W8" charset="-128"/>
-              <a:cs typeface="Hiragino Kaku Gothic StdN W8" charset="-128"/>
-            </a:endParaRPr>
           </a:p>
         </p:txBody>
       </p:sp>
@@ -12752,6 +12684,111 @@
               <a:latin typeface="Hiragino Kaku Gothic Pro W6" charset="-128"/>
               <a:ea typeface="Hiragino Kaku Gothic Pro W6" charset="-128"/>
               <a:cs typeface="Hiragino Kaku Gothic Pro W6" charset="-128"/>
+            </a:endParaRPr>
+          </a:p>
+        </p:txBody>
+      </p:sp>
+      <p:sp>
+        <p:nvSpPr>
+          <p:cNvPr id="2" name="円形吹き出し 1"/>
+          <p:cNvSpPr/>
+          <p:nvPr/>
+        </p:nvSpPr>
+        <p:spPr>
+          <a:xfrm>
+            <a:off x="4249612" y="4645071"/>
+            <a:ext cx="2684383" cy="1772048"/>
+          </a:xfrm>
+          <a:prstGeom prst="wedgeEllipseCallout">
+            <a:avLst>
+              <a:gd name="adj1" fmla="val -22600"/>
+              <a:gd name="adj2" fmla="val -37579"/>
+            </a:avLst>
+          </a:prstGeom>
+          <a:solidFill>
+            <a:schemeClr val="bg1"/>
+          </a:solidFill>
+          <a:ln>
+            <a:solidFill>
+              <a:schemeClr val="tx1">
+                <a:lumMod val="85000"/>
+                <a:lumOff val="15000"/>
+              </a:schemeClr>
+            </a:solidFill>
+          </a:ln>
+        </p:spPr>
+        <p:style>
+          <a:lnRef idx="2">
+            <a:schemeClr val="accent1">
+              <a:shade val="50000"/>
+            </a:schemeClr>
+          </a:lnRef>
+          <a:fillRef idx="1">
+            <a:schemeClr val="accent1"/>
+          </a:fillRef>
+          <a:effectRef idx="0">
+            <a:schemeClr val="accent1"/>
+          </a:effectRef>
+          <a:fontRef idx="minor">
+            <a:schemeClr val="lt1"/>
+          </a:fontRef>
+        </p:style>
+        <p:txBody>
+          <a:bodyPr rtlCol="0" anchor="ctr"/>
+          <a:lstStyle/>
+          <a:p>
+            <a:pPr algn="ctr"/>
+            <a:r>
+              <a:rPr kumimoji="1" lang="ja-JP" altLang="en-US" sz="2200" dirty="0" smtClean="0">
+                <a:solidFill>
+                  <a:srgbClr val="FF0000"/>
+                </a:solidFill>
+                <a:latin typeface="Hiragino Kaku Gothic StdN W8" charset="-128"/>
+                <a:ea typeface="Hiragino Kaku Gothic StdN W8" charset="-128"/>
+                <a:cs typeface="Hiragino Kaku Gothic StdN W8" charset="-128"/>
+              </a:rPr>
+              <a:t>おかげさまで</a:t>
+            </a:r>
+            <a:endParaRPr kumimoji="1" lang="en-US" altLang="ja-JP" sz="2200" dirty="0" smtClean="0">
+              <a:solidFill>
+                <a:srgbClr val="FF0000"/>
+              </a:solidFill>
+              <a:latin typeface="Hiragino Kaku Gothic StdN W8" charset="-128"/>
+              <a:ea typeface="Hiragino Kaku Gothic StdN W8" charset="-128"/>
+              <a:cs typeface="Hiragino Kaku Gothic StdN W8" charset="-128"/>
+            </a:endParaRPr>
+          </a:p>
+          <a:p>
+            <a:pPr algn="ctr"/>
+            <a:r>
+              <a:rPr lang="ja-JP" altLang="en-US" sz="3200" dirty="0" smtClean="0">
+                <a:solidFill>
+                  <a:srgbClr val="FF0000"/>
+                </a:solidFill>
+                <a:latin typeface="Hiragino Kaku Gothic StdN W8" charset="-128"/>
+                <a:ea typeface="Hiragino Kaku Gothic StdN W8" charset="-128"/>
+                <a:cs typeface="Hiragino Kaku Gothic StdN W8" charset="-128"/>
+              </a:rPr>
+              <a:t>５周年</a:t>
+            </a:r>
+            <a:r>
+              <a:rPr lang="en-US" altLang="ja-JP" sz="3200" dirty="0" smtClean="0">
+                <a:solidFill>
+                  <a:srgbClr val="FF0000"/>
+                </a:solidFill>
+                <a:latin typeface="Hiragino Kaku Gothic StdN W8" charset="-128"/>
+                <a:ea typeface="Hiragino Kaku Gothic StdN W8" charset="-128"/>
+                <a:cs typeface="Hiragino Kaku Gothic StdN W8" charset="-128"/>
+              </a:rPr>
+              <a:t>!!!</a:t>
+            </a:r>
+            <a:endParaRPr kumimoji="1" lang="ja-JP" altLang="en-US" sz="3200" dirty="0">
+              <a:solidFill>
+                <a:srgbClr val="FF0000"/>
+              </a:solidFill>
+              <a:latin typeface="Hiragino Kaku Gothic StdN W8" charset="-128"/>
+              <a:ea typeface="Hiragino Kaku Gothic StdN W8" charset="-128"/>
+              <a:cs typeface="Hiragino Kaku Gothic StdN W8" charset="-128"/>
             </a:endParaRPr>
           </a:p>
         </p:txBody>

</xml_diff>

<commit_message>
fixed a contest date in poster.pptx
</commit_message>
<xml_diff>
--- a/2017/keynote/poster.pptx
+++ b/2017/keynote/poster.pptx
@@ -6,7 +6,6 @@
   </p:sldMasterIdLst>
   <p:sldIdLst>
     <p:sldId id="259" r:id="rId2"/>
-    <p:sldId id="260" r:id="rId3"/>
   </p:sldIdLst>
   <p:sldSz cx="6858000" cy="9907588"/>
   <p:notesSz cx="6858000" cy="9144000"/>
@@ -244,7 +243,7 @@
           <a:p>
             <a:fld id="{CC1A3C40-BB27-6A41-900E-7805D71DCC3A}" type="datetimeFigureOut">
               <a:rPr kumimoji="1" lang="ja-JP" altLang="en-US" smtClean="0"/>
-              <a:t>2017/10/24</a:t>
+              <a:t>2017/10/27</a:t>
             </a:fld>
             <a:endParaRPr kumimoji="1" lang="ja-JP" altLang="en-US"/>
           </a:p>
@@ -441,7 +440,7 @@
           <a:p>
             <a:fld id="{CC1A3C40-BB27-6A41-900E-7805D71DCC3A}" type="datetimeFigureOut">
               <a:rPr kumimoji="1" lang="ja-JP" altLang="en-US" smtClean="0"/>
-              <a:t>2017/10/24</a:t>
+              <a:t>2017/10/27</a:t>
             </a:fld>
             <a:endParaRPr kumimoji="1" lang="ja-JP" altLang="en-US"/>
           </a:p>
@@ -648,7 +647,7 @@
           <a:p>
             <a:fld id="{CC1A3C40-BB27-6A41-900E-7805D71DCC3A}" type="datetimeFigureOut">
               <a:rPr kumimoji="1" lang="ja-JP" altLang="en-US" smtClean="0"/>
-              <a:t>2017/10/24</a:t>
+              <a:t>2017/10/27</a:t>
             </a:fld>
             <a:endParaRPr kumimoji="1" lang="ja-JP" altLang="en-US"/>
           </a:p>
@@ -845,7 +844,7 @@
           <a:p>
             <a:fld id="{CC1A3C40-BB27-6A41-900E-7805D71DCC3A}" type="datetimeFigureOut">
               <a:rPr kumimoji="1" lang="ja-JP" altLang="en-US" smtClean="0"/>
-              <a:t>2017/10/24</a:t>
+              <a:t>2017/10/27</a:t>
             </a:fld>
             <a:endParaRPr kumimoji="1" lang="ja-JP" altLang="en-US"/>
           </a:p>
@@ -1084,7 +1083,7 @@
           <a:p>
             <a:fld id="{CC1A3C40-BB27-6A41-900E-7805D71DCC3A}" type="datetimeFigureOut">
               <a:rPr kumimoji="1" lang="ja-JP" altLang="en-US" smtClean="0"/>
-              <a:t>2017/10/24</a:t>
+              <a:t>2017/10/27</a:t>
             </a:fld>
             <a:endParaRPr kumimoji="1" lang="ja-JP" altLang="en-US"/>
           </a:p>
@@ -1375,7 +1374,7 @@
           <a:p>
             <a:fld id="{CC1A3C40-BB27-6A41-900E-7805D71DCC3A}" type="datetimeFigureOut">
               <a:rPr kumimoji="1" lang="ja-JP" altLang="en-US" smtClean="0"/>
-              <a:t>2017/10/24</a:t>
+              <a:t>2017/10/27</a:t>
             </a:fld>
             <a:endParaRPr kumimoji="1" lang="ja-JP" altLang="en-US"/>
           </a:p>
@@ -1801,7 +1800,7 @@
           <a:p>
             <a:fld id="{CC1A3C40-BB27-6A41-900E-7805D71DCC3A}" type="datetimeFigureOut">
               <a:rPr kumimoji="1" lang="ja-JP" altLang="en-US" smtClean="0"/>
-              <a:t>2017/10/24</a:t>
+              <a:t>2017/10/27</a:t>
             </a:fld>
             <a:endParaRPr kumimoji="1" lang="ja-JP" altLang="en-US"/>
           </a:p>
@@ -1914,7 +1913,7 @@
           <a:p>
             <a:fld id="{CC1A3C40-BB27-6A41-900E-7805D71DCC3A}" type="datetimeFigureOut">
               <a:rPr kumimoji="1" lang="ja-JP" altLang="en-US" smtClean="0"/>
-              <a:t>2017/10/24</a:t>
+              <a:t>2017/10/27</a:t>
             </a:fld>
             <a:endParaRPr kumimoji="1" lang="ja-JP" altLang="en-US"/>
           </a:p>
@@ -2004,7 +2003,7 @@
           <a:p>
             <a:fld id="{CC1A3C40-BB27-6A41-900E-7805D71DCC3A}" type="datetimeFigureOut">
               <a:rPr kumimoji="1" lang="ja-JP" altLang="en-US" smtClean="0"/>
-              <a:t>2017/10/24</a:t>
+              <a:t>2017/10/27</a:t>
             </a:fld>
             <a:endParaRPr kumimoji="1" lang="ja-JP" altLang="en-US"/>
           </a:p>
@@ -2308,7 +2307,7 @@
           <a:p>
             <a:fld id="{CC1A3C40-BB27-6A41-900E-7805D71DCC3A}" type="datetimeFigureOut">
               <a:rPr kumimoji="1" lang="ja-JP" altLang="en-US" smtClean="0"/>
-              <a:t>2017/10/24</a:t>
+              <a:t>2017/10/27</a:t>
             </a:fld>
             <a:endParaRPr kumimoji="1" lang="ja-JP" altLang="en-US"/>
           </a:p>
@@ -2560,7 +2559,7 @@
           <a:p>
             <a:fld id="{CC1A3C40-BB27-6A41-900E-7805D71DCC3A}" type="datetimeFigureOut">
               <a:rPr kumimoji="1" lang="ja-JP" altLang="en-US" smtClean="0"/>
-              <a:t>2017/10/24</a:t>
+              <a:t>2017/10/27</a:t>
             </a:fld>
             <a:endParaRPr kumimoji="1" lang="ja-JP" altLang="en-US"/>
           </a:p>
@@ -2800,7 +2799,7 @@
           <a:p>
             <a:fld id="{CC1A3C40-BB27-6A41-900E-7805D71DCC3A}" type="datetimeFigureOut">
               <a:rPr kumimoji="1" lang="ja-JP" altLang="en-US" smtClean="0"/>
-              <a:t>2017/10/24</a:t>
+              <a:t>2017/10/27</a:t>
             </a:fld>
             <a:endParaRPr kumimoji="1" lang="ja-JP" altLang="en-US"/>
           </a:p>
@@ -3368,7 +3367,7 @@
                 <a:ea typeface="Hiragino Kaku Gothic StdN W8" charset="-128"/>
                 <a:cs typeface="Hiragino Kaku Gothic StdN W8" charset="-128"/>
               </a:rPr>
-              <a:t>25</a:t>
+              <a:t>18</a:t>
             </a:r>
             <a:r>
               <a:rPr lang="ja-JP" altLang="en-US" sz="3200" b="1" dirty="0" smtClean="0">
@@ -3387,7 +3386,26 @@
                 <a:ea typeface="Hiragino Kaku Gothic StdN W8" charset="-128"/>
                 <a:cs typeface="Hiragino Kaku Gothic StdN W8" charset="-128"/>
               </a:rPr>
-              <a:t>日（土）</a:t>
+              <a:t>日</a:t>
+            </a:r>
+            <a:r>
+              <a:rPr lang="ja-JP" altLang="en-US" sz="3200" b="1" dirty="0" smtClean="0">
+                <a:ln w="15875">
+                  <a:solidFill>
+                    <a:schemeClr val="bg2">
+                      <a:lumMod val="25000"/>
+                    </a:schemeClr>
+                  </a:solidFill>
+                  <a:prstDash val="solid"/>
+                </a:ln>
+                <a:solidFill>
+                  <a:schemeClr val="bg1"/>
+                </a:solidFill>
+                <a:latin typeface="Hiragino Kaku Gothic StdN W8" charset="-128"/>
+                <a:ea typeface="Hiragino Kaku Gothic StdN W8" charset="-128"/>
+                <a:cs typeface="Hiragino Kaku Gothic StdN W8" charset="-128"/>
+              </a:rPr>
+              <a:t>（土）</a:t>
             </a:r>
             <a:endParaRPr lang="en-US" altLang="ja-JP" sz="3200" b="1" dirty="0" smtClean="0">
               <a:ln w="15875">
@@ -4915,8 +4933,8 @@
         </p:nvSpPr>
         <p:spPr>
           <a:xfrm>
-            <a:off x="113966" y="7229578"/>
-            <a:ext cx="4852610" cy="523220"/>
+            <a:off x="113966" y="7139245"/>
+            <a:ext cx="4277133" cy="523220"/>
           </a:xfrm>
           <a:prstGeom prst="rect">
             <a:avLst/>
@@ -4947,52 +4965,10 @@
                 <a:ea typeface="Hiragino Kaku Gothic StdN W8" charset="-128"/>
                 <a:cs typeface="Hiragino Kaku Gothic StdN W8" charset="-128"/>
               </a:rPr>
-              <a:t>ティザーサイトはこちら↓→</a:t>
-            </a:r>
-            <a:endParaRPr lang="en-US" altLang="ja-JP" sz="2800" b="1" dirty="0" smtClean="0">
-              <a:ln w="15875">
-                <a:solidFill>
-                  <a:schemeClr val="tx1">
-                    <a:lumMod val="85000"/>
-                    <a:lumOff val="15000"/>
-                  </a:schemeClr>
-                </a:solidFill>
-                <a:prstDash val="solid"/>
-              </a:ln>
-              <a:solidFill>
-                <a:schemeClr val="bg1"/>
-              </a:solidFill>
-              <a:latin typeface="Hiragino Kaku Gothic StdN W8" charset="-128"/>
-              <a:ea typeface="Hiragino Kaku Gothic StdN W8" charset="-128"/>
-              <a:cs typeface="Hiragino Kaku Gothic StdN W8" charset="-128"/>
-            </a:endParaRPr>
-          </a:p>
-        </p:txBody>
-      </p:sp>
-      <p:sp>
-        <p:nvSpPr>
-          <p:cNvPr id="26" name="テキスト ボックス 25"/>
-          <p:cNvSpPr txBox="1"/>
-          <p:nvPr/>
-        </p:nvSpPr>
-        <p:spPr>
-          <a:xfrm>
-            <a:off x="115449" y="7708260"/>
-            <a:ext cx="922047" cy="461665"/>
-          </a:xfrm>
-          <a:prstGeom prst="rect">
-            <a:avLst/>
-          </a:prstGeom>
-          <a:noFill/>
-        </p:spPr>
-        <p:txBody>
-          <a:bodyPr wrap="none" rtlCol="0">
-            <a:spAutoFit/>
-          </a:bodyPr>
-          <a:lstStyle/>
-          <a:p>
-            <a:r>
-              <a:rPr lang="en-US" altLang="ja-JP" sz="2400" b="1" dirty="0" smtClean="0">
+              <a:t>ティザーサイトへの</a:t>
+            </a:r>
+            <a:r>
+              <a:rPr lang="en-US" altLang="ja-JP" sz="2800" b="1" dirty="0" smtClean="0">
                 <a:ln w="15875">
                   <a:solidFill>
                     <a:schemeClr val="tx1">
@@ -5016,54 +4992,14 @@
       </p:sp>
       <p:sp>
         <p:nvSpPr>
-          <p:cNvPr id="28" name="正方形/長方形 27"/>
-          <p:cNvSpPr/>
+          <p:cNvPr id="26" name="テキスト ボックス 25"/>
+          <p:cNvSpPr txBox="1"/>
           <p:nvPr/>
         </p:nvSpPr>
         <p:spPr>
           <a:xfrm>
-            <a:off x="5245846" y="7349794"/>
-            <a:ext cx="1422381" cy="1043343"/>
-          </a:xfrm>
-          <a:prstGeom prst="rect">
-            <a:avLst/>
-          </a:prstGeom>
-        </p:spPr>
-        <p:style>
-          <a:lnRef idx="2">
-            <a:schemeClr val="accent1">
-              <a:shade val="50000"/>
-            </a:schemeClr>
-          </a:lnRef>
-          <a:fillRef idx="1">
-            <a:schemeClr val="accent1"/>
-          </a:fillRef>
-          <a:effectRef idx="0">
-            <a:schemeClr val="accent1"/>
-          </a:effectRef>
-          <a:fontRef idx="minor">
-            <a:schemeClr val="lt1"/>
-          </a:fontRef>
-        </p:style>
-        <p:txBody>
-          <a:bodyPr rtlCol="0" anchor="ctr"/>
-          <a:lstStyle/>
-          <a:p>
-            <a:pPr algn="ctr"/>
-            <a:endParaRPr kumimoji="1" lang="ja-JP" altLang="en-US"/>
-          </a:p>
-        </p:txBody>
-      </p:sp>
-      <p:sp>
-        <p:nvSpPr>
-          <p:cNvPr id="29" name="テキスト ボックス 28"/>
-          <p:cNvSpPr txBox="1"/>
-          <p:nvPr/>
-        </p:nvSpPr>
-        <p:spPr>
-          <a:xfrm>
-            <a:off x="5241613" y="7590208"/>
-            <a:ext cx="1369286" cy="393954"/>
+            <a:off x="137110" y="7501351"/>
+            <a:ext cx="6750566" cy="400110"/>
           </a:xfrm>
           <a:prstGeom prst="rect">
             <a:avLst/>
@@ -5077,7 +5013,15 @@
           <a:lstStyle/>
           <a:p>
             <a:r>
-              <a:rPr lang="en-US" altLang="ja-JP" dirty="0" smtClean="0">
+              <a:rPr lang="en-US" altLang="ja-JP" sz="2000" b="1" dirty="0">
+                <a:ln w="15875">
+                  <a:solidFill>
+                    <a:schemeClr val="bg2">
+                      <a:lumMod val="25000"/>
+                    </a:schemeClr>
+                  </a:solidFill>
+                  <a:prstDash val="solid"/>
+                </a:ln>
                 <a:solidFill>
                   <a:schemeClr val="bg1"/>
                 </a:solidFill>
@@ -5085,10 +5029,18 @@
                 <a:ea typeface="Hiragino Kaku Gothic StdN W8" charset="-128"/>
                 <a:cs typeface="Hiragino Kaku Gothic StdN W8" charset="-128"/>
               </a:rPr>
-              <a:t>QR</a:t>
-            </a:r>
-            <a:r>
-              <a:rPr lang="ja-JP" altLang="en-US" dirty="0" smtClean="0">
+              <a:t>https://</a:t>
+            </a:r>
+            <a:r>
+              <a:rPr lang="en-US" altLang="ja-JP" sz="2000" b="1" dirty="0" err="1">
+                <a:ln w="15875">
+                  <a:solidFill>
+                    <a:schemeClr val="bg2">
+                      <a:lumMod val="25000"/>
+                    </a:schemeClr>
+                  </a:solidFill>
+                  <a:prstDash val="solid"/>
+                </a:ln>
                 <a:solidFill>
                   <a:schemeClr val="bg1"/>
                 </a:solidFill>
@@ -5096,9 +5048,36 @@
                 <a:ea typeface="Hiragino Kaku Gothic StdN W8" charset="-128"/>
                 <a:cs typeface="Hiragino Kaku Gothic StdN W8" charset="-128"/>
               </a:rPr>
-              <a:t>コード</a:t>
-            </a:r>
-            <a:endParaRPr kumimoji="1" lang="ja-JP" altLang="en-US" dirty="0">
+              <a:t>tcjudge.github.io</a:t>
+            </a:r>
+            <a:r>
+              <a:rPr lang="en-US" altLang="ja-JP" sz="2000" b="1" dirty="0">
+                <a:ln w="15875">
+                  <a:solidFill>
+                    <a:schemeClr val="bg2">
+                      <a:lumMod val="25000"/>
+                    </a:schemeClr>
+                  </a:solidFill>
+                  <a:prstDash val="solid"/>
+                </a:ln>
+                <a:solidFill>
+                  <a:schemeClr val="bg1"/>
+                </a:solidFill>
+                <a:latin typeface="Hiragino Kaku Gothic StdN W8" charset="-128"/>
+                <a:ea typeface="Hiragino Kaku Gothic StdN W8" charset="-128"/>
+                <a:cs typeface="Hiragino Kaku Gothic StdN W8" charset="-128"/>
+              </a:rPr>
+              <a:t>/teaser-site/2017/</a:t>
+            </a:r>
+            <a:endParaRPr lang="en-US" altLang="ja-JP" sz="2000" b="1" dirty="0" smtClean="0">
+              <a:ln w="15875">
+                <a:solidFill>
+                  <a:schemeClr val="bg2">
+                    <a:lumMod val="25000"/>
+                  </a:schemeClr>
+                </a:solidFill>
+                <a:prstDash val="solid"/>
+              </a:ln>
               <a:solidFill>
                 <a:schemeClr val="bg1"/>
               </a:solidFill>
@@ -5792,497 +5771,238 @@
           </a:p>
         </p:txBody>
       </p:sp>
-    </p:spTree>
-    <p:extLst>
-      <p:ext uri="{BB962C8B-B14F-4D97-AF65-F5344CB8AC3E}">
-        <p14:creationId xmlns:p14="http://schemas.microsoft.com/office/powerpoint/2010/main" val="1364431154"/>
-      </p:ext>
-    </p:extLst>
-  </p:cSld>
-  <p:clrMapOvr>
-    <a:masterClrMapping/>
-  </p:clrMapOvr>
-  <p:timing>
-    <p:tnLst>
-      <p:par>
-        <p:cTn id="1" dur="indefinite" restart="never" nodeType="tmRoot"/>
-      </p:par>
-    </p:tnLst>
-  </p:timing>
-</p:sld>
-</file>
-
-<file path=ppt/slides/slide2.xml><?xml version="1.0" encoding="utf-8"?>
-<p:sld xmlns:a="http://schemas.openxmlformats.org/drawingml/2006/main" xmlns:r="http://schemas.openxmlformats.org/officeDocument/2006/relationships" xmlns:p="http://schemas.openxmlformats.org/presentationml/2006/main">
-  <p:cSld>
-    <p:spTree>
-      <p:nvGrpSpPr>
-        <p:cNvPr id="1" name=""/>
-        <p:cNvGrpSpPr/>
-        <p:nvPr/>
-      </p:nvGrpSpPr>
-      <p:grpSpPr>
-        <a:xfrm>
-          <a:off x="0" y="0"/>
-          <a:ext cx="0" cy="0"/>
-          <a:chOff x="0" y="0"/>
-          <a:chExt cx="0" cy="0"/>
-        </a:xfrm>
-      </p:grpSpPr>
-      <p:grpSp>
-        <p:nvGrpSpPr>
-          <p:cNvPr id="11" name="図形グループ 10"/>
-          <p:cNvGrpSpPr/>
+      <p:sp>
+        <p:nvSpPr>
+          <p:cNvPr id="20" name="角丸四角形 19"/>
+          <p:cNvSpPr/>
           <p:nvPr/>
-        </p:nvGrpSpPr>
-        <p:grpSpPr>
+        </p:nvSpPr>
+        <p:spPr>
           <a:xfrm>
-            <a:off x="-2198131" y="1813526"/>
-            <a:ext cx="11100882" cy="6718303"/>
-            <a:chOff x="-2198131" y="1813526"/>
-            <a:chExt cx="11100882" cy="6718303"/>
+            <a:off x="1725530" y="7991658"/>
+            <a:ext cx="4716788" cy="455450"/>
           </a:xfrm>
-        </p:grpSpPr>
-        <p:sp>
-          <p:nvSpPr>
-            <p:cNvPr id="4" name="テキスト ボックス 3"/>
-            <p:cNvSpPr txBox="1"/>
-            <p:nvPr/>
-          </p:nvSpPr>
-          <p:spPr>
-            <a:xfrm>
-              <a:off x="-354912" y="4307166"/>
-              <a:ext cx="4750018" cy="1754326"/>
-            </a:xfrm>
-            <a:prstGeom prst="rect">
-              <a:avLst/>
-            </a:prstGeom>
-            <a:noFill/>
-          </p:spPr>
-          <p:txBody>
-            <a:bodyPr wrap="none" rtlCol="0">
-              <a:spAutoFit/>
-            </a:bodyPr>
-            <a:lstStyle/>
-            <a:p>
-              <a:r>
-                <a:rPr lang="en-US" altLang="ja-JP" sz="3200" b="1" dirty="0" smtClean="0">
-                  <a:ln w="15875">
-                    <a:solidFill>
-                      <a:schemeClr val="bg2">
-                        <a:lumMod val="25000"/>
-                      </a:schemeClr>
-                    </a:solidFill>
-                    <a:prstDash val="solid"/>
-                  </a:ln>
-                  <a:solidFill>
-                    <a:schemeClr val="bg1"/>
-                  </a:solidFill>
-                  <a:latin typeface="Hiragino Kaku Gothic StdN W8" charset="-128"/>
-                  <a:ea typeface="Hiragino Kaku Gothic StdN W8" charset="-128"/>
-                  <a:cs typeface="Hiragino Kaku Gothic StdN W8" charset="-128"/>
-                </a:rPr>
-                <a:t>2017</a:t>
-              </a:r>
-              <a:r>
-                <a:rPr lang="ja-JP" altLang="en-US" sz="3200" b="1" dirty="0" smtClean="0">
-                  <a:ln w="15875">
-                    <a:solidFill>
-                      <a:schemeClr val="bg2">
-                        <a:lumMod val="25000"/>
-                      </a:schemeClr>
-                    </a:solidFill>
-                    <a:prstDash val="solid"/>
-                  </a:ln>
-                  <a:solidFill>
-                    <a:schemeClr val="bg1"/>
-                  </a:solidFill>
-                  <a:latin typeface="Hiragino Kaku Gothic StdN W8" charset="-128"/>
-                  <a:ea typeface="Hiragino Kaku Gothic StdN W8" charset="-128"/>
-                  <a:cs typeface="Hiragino Kaku Gothic StdN W8" charset="-128"/>
-                </a:rPr>
-                <a:t>年</a:t>
-              </a:r>
-              <a:endParaRPr lang="en-US" altLang="ja-JP" sz="3200" b="1" dirty="0" smtClean="0">
-                <a:ln w="15875">
-                  <a:solidFill>
-                    <a:schemeClr val="bg2">
-                      <a:lumMod val="25000"/>
-                    </a:schemeClr>
-                  </a:solidFill>
-                  <a:prstDash val="solid"/>
-                </a:ln>
-                <a:solidFill>
-                  <a:schemeClr val="bg1"/>
-                </a:solidFill>
+          <a:prstGeom prst="roundRect">
+            <a:avLst/>
+          </a:prstGeom>
+          <a:solidFill>
+            <a:schemeClr val="bg1"/>
+          </a:solidFill>
+          <a:ln w="28575">
+            <a:solidFill>
+              <a:srgbClr val="0432FF"/>
+            </a:solidFill>
+          </a:ln>
+        </p:spPr>
+        <p:style>
+          <a:lnRef idx="2">
+            <a:schemeClr val="accent1">
+              <a:shade val="50000"/>
+            </a:schemeClr>
+          </a:lnRef>
+          <a:fillRef idx="1">
+            <a:schemeClr val="accent1"/>
+          </a:fillRef>
+          <a:effectRef idx="0">
+            <a:schemeClr val="accent1"/>
+          </a:effectRef>
+          <a:fontRef idx="minor">
+            <a:schemeClr val="lt1"/>
+          </a:fontRef>
+        </p:style>
+        <p:txBody>
+          <a:bodyPr rtlCol="0" anchor="ctr"/>
+          <a:lstStyle/>
+          <a:p>
+            <a:pPr algn="ctr"/>
+            <a:endParaRPr kumimoji="1" lang="ja-JP" altLang="en-US" b="1">
+              <a:ln w="22225">
+                <a:solidFill>
+                  <a:schemeClr val="accent2"/>
+                </a:solidFill>
+                <a:prstDash val="solid"/>
+              </a:ln>
+              <a:solidFill>
+                <a:schemeClr val="accent2">
+                  <a:lumMod val="40000"/>
+                  <a:lumOff val="60000"/>
+                </a:schemeClr>
+              </a:solidFill>
+            </a:endParaRPr>
+          </a:p>
+        </p:txBody>
+      </p:sp>
+      <p:sp>
+        <p:nvSpPr>
+          <p:cNvPr id="24" name="テキスト ボックス 23"/>
+          <p:cNvSpPr txBox="1"/>
+          <p:nvPr/>
+        </p:nvSpPr>
+        <p:spPr>
+          <a:xfrm>
+            <a:off x="1824131" y="7990584"/>
+            <a:ext cx="2624436" cy="393954"/>
+          </a:xfrm>
+          <a:prstGeom prst="rect">
+            <a:avLst/>
+          </a:prstGeom>
+          <a:noFill/>
+        </p:spPr>
+        <p:txBody>
+          <a:bodyPr wrap="none" rtlCol="0">
+            <a:spAutoFit/>
+          </a:bodyPr>
+          <a:lstStyle/>
+          <a:p>
+            <a:r>
+              <a:rPr kumimoji="1" lang="en-US" altLang="ja-JP" smtClean="0">
                 <a:latin typeface="Hiragino Kaku Gothic StdN W8" charset="-128"/>
                 <a:ea typeface="Hiragino Kaku Gothic StdN W8" charset="-128"/>
                 <a:cs typeface="Hiragino Kaku Gothic StdN W8" charset="-128"/>
-              </a:endParaRPr>
-            </a:p>
-            <a:p>
-              <a:r>
-                <a:rPr lang="en-US" altLang="ja-JP" sz="4400" b="1" dirty="0" smtClean="0">
-                  <a:ln w="15875">
-                    <a:solidFill>
-                      <a:schemeClr val="bg2">
-                        <a:lumMod val="25000"/>
-                      </a:schemeClr>
-                    </a:solidFill>
-                    <a:prstDash val="solid"/>
-                  </a:ln>
-                  <a:solidFill>
-                    <a:schemeClr val="bg1"/>
-                  </a:solidFill>
-                  <a:latin typeface="Hiragino Kaku Gothic StdN W8" charset="-128"/>
-                  <a:ea typeface="Hiragino Kaku Gothic StdN W8" charset="-128"/>
-                  <a:cs typeface="Hiragino Kaku Gothic StdN W8" charset="-128"/>
-                </a:rPr>
-                <a:t>11</a:t>
-              </a:r>
-              <a:r>
-                <a:rPr lang="ja-JP" altLang="en-US" sz="4400" b="1" dirty="0" smtClean="0">
-                  <a:ln w="15875">
-                    <a:solidFill>
-                      <a:schemeClr val="bg2">
-                        <a:lumMod val="25000"/>
-                      </a:schemeClr>
-                    </a:solidFill>
-                    <a:prstDash val="solid"/>
-                  </a:ln>
-                  <a:solidFill>
-                    <a:schemeClr val="bg1"/>
-                  </a:solidFill>
-                  <a:latin typeface="Hiragino Kaku Gothic StdN W8" charset="-128"/>
-                  <a:ea typeface="Hiragino Kaku Gothic StdN W8" charset="-128"/>
-                  <a:cs typeface="Hiragino Kaku Gothic StdN W8" charset="-128"/>
-                </a:rPr>
-                <a:t>月</a:t>
-              </a:r>
-              <a:r>
-                <a:rPr lang="en-US" altLang="ja-JP" sz="4400" b="1" dirty="0" smtClean="0">
-                  <a:ln w="15875">
-                    <a:solidFill>
-                      <a:schemeClr val="bg2">
-                        <a:lumMod val="25000"/>
-                      </a:schemeClr>
-                    </a:solidFill>
-                    <a:prstDash val="solid"/>
-                  </a:ln>
-                  <a:solidFill>
-                    <a:schemeClr val="bg1"/>
-                  </a:solidFill>
-                  <a:latin typeface="Hiragino Kaku Gothic StdN W8" charset="-128"/>
-                  <a:ea typeface="Hiragino Kaku Gothic StdN W8" charset="-128"/>
-                  <a:cs typeface="Hiragino Kaku Gothic StdN W8" charset="-128"/>
-                </a:rPr>
-                <a:t>25</a:t>
-              </a:r>
-              <a:r>
-                <a:rPr lang="ja-JP" altLang="en-US" sz="4400" b="1" dirty="0" smtClean="0">
-                  <a:ln w="15875">
-                    <a:solidFill>
-                      <a:schemeClr val="bg2">
-                        <a:lumMod val="25000"/>
-                      </a:schemeClr>
-                    </a:solidFill>
-                    <a:prstDash val="solid"/>
-                  </a:ln>
-                  <a:solidFill>
-                    <a:schemeClr val="bg1"/>
-                  </a:solidFill>
-                  <a:latin typeface="Hiragino Kaku Gothic StdN W8" charset="-128"/>
-                  <a:ea typeface="Hiragino Kaku Gothic StdN W8" charset="-128"/>
-                  <a:cs typeface="Hiragino Kaku Gothic StdN W8" charset="-128"/>
-                </a:rPr>
-                <a:t>日（土）</a:t>
-              </a:r>
-              <a:endParaRPr lang="en-US" altLang="ja-JP" sz="4400" b="1" dirty="0" smtClean="0">
-                <a:ln w="15875">
-                  <a:solidFill>
-                    <a:schemeClr val="bg2">
-                      <a:lumMod val="25000"/>
-                    </a:schemeClr>
-                  </a:solidFill>
-                  <a:prstDash val="solid"/>
-                </a:ln>
+              </a:rPr>
+              <a:t>TeraCoder2017</a:t>
+            </a:r>
+            <a:endParaRPr kumimoji="1" lang="ja-JP" altLang="en-US" dirty="0">
+              <a:latin typeface="Hiragino Kaku Gothic StdN W8" charset="-128"/>
+              <a:ea typeface="Hiragino Kaku Gothic StdN W8" charset="-128"/>
+              <a:cs typeface="Hiragino Kaku Gothic StdN W8" charset="-128"/>
+            </a:endParaRPr>
+          </a:p>
+        </p:txBody>
+      </p:sp>
+      <p:sp>
+        <p:nvSpPr>
+          <p:cNvPr id="35" name="角丸四角形 34"/>
+          <p:cNvSpPr/>
+          <p:nvPr/>
+        </p:nvSpPr>
+        <p:spPr>
+          <a:xfrm>
+            <a:off x="5261604" y="8039323"/>
+            <a:ext cx="1111881" cy="364127"/>
+          </a:xfrm>
+          <a:prstGeom prst="roundRect">
+            <a:avLst/>
+          </a:prstGeom>
+          <a:solidFill>
+            <a:schemeClr val="bg2">
+              <a:lumMod val="25000"/>
+            </a:schemeClr>
+          </a:solidFill>
+          <a:ln w="28575">
+            <a:solidFill>
+              <a:schemeClr val="bg2">
+                <a:lumMod val="25000"/>
+              </a:schemeClr>
+            </a:solidFill>
+          </a:ln>
+        </p:spPr>
+        <p:style>
+          <a:lnRef idx="2">
+            <a:schemeClr val="accent1">
+              <a:shade val="50000"/>
+            </a:schemeClr>
+          </a:lnRef>
+          <a:fillRef idx="1">
+            <a:schemeClr val="accent1"/>
+          </a:fillRef>
+          <a:effectRef idx="0">
+            <a:schemeClr val="accent1"/>
+          </a:effectRef>
+          <a:fontRef idx="minor">
+            <a:schemeClr val="lt1"/>
+          </a:fontRef>
+        </p:style>
+        <p:txBody>
+          <a:bodyPr rtlCol="0" anchor="ctr"/>
+          <a:lstStyle/>
+          <a:p>
+            <a:pPr algn="ctr"/>
+            <a:endParaRPr kumimoji="1" lang="ja-JP" altLang="en-US" b="1">
+              <a:ln w="22225">
+                <a:solidFill>
+                  <a:schemeClr val="accent2"/>
+                </a:solidFill>
+                <a:prstDash val="solid"/>
+              </a:ln>
+              <a:solidFill>
+                <a:schemeClr val="accent2">
+                  <a:lumMod val="40000"/>
+                  <a:lumOff val="60000"/>
+                </a:schemeClr>
+              </a:solidFill>
+            </a:endParaRPr>
+          </a:p>
+        </p:txBody>
+      </p:sp>
+      <p:sp>
+        <p:nvSpPr>
+          <p:cNvPr id="36" name="テキスト ボックス 35"/>
+          <p:cNvSpPr txBox="1"/>
+          <p:nvPr/>
+        </p:nvSpPr>
+        <p:spPr>
+          <a:xfrm>
+            <a:off x="5473539" y="8006267"/>
+            <a:ext cx="688009" cy="393954"/>
+          </a:xfrm>
+          <a:prstGeom prst="rect">
+            <a:avLst/>
+          </a:prstGeom>
+          <a:noFill/>
+        </p:spPr>
+        <p:txBody>
+          <a:bodyPr wrap="none" rtlCol="0">
+            <a:spAutoFit/>
+          </a:bodyPr>
+          <a:lstStyle/>
+          <a:p>
+            <a:r>
+              <a:rPr kumimoji="1" lang="ja-JP" altLang="en-US" dirty="0" smtClean="0">
                 <a:solidFill>
                   <a:schemeClr val="bg1"/>
                 </a:solidFill>
                 <a:latin typeface="Hiragino Kaku Gothic StdN W8" charset="-128"/>
                 <a:ea typeface="Hiragino Kaku Gothic StdN W8" charset="-128"/>
                 <a:cs typeface="Hiragino Kaku Gothic StdN W8" charset="-128"/>
-              </a:endParaRPr>
-            </a:p>
-            <a:p>
-              <a:r>
-                <a:rPr lang="en-US" altLang="ja-JP" sz="3200" b="1" dirty="0" smtClean="0">
-                  <a:ln w="15875">
-                    <a:solidFill>
-                      <a:schemeClr val="bg2">
-                        <a:lumMod val="25000"/>
-                      </a:schemeClr>
-                    </a:solidFill>
-                    <a:prstDash val="solid"/>
-                  </a:ln>
-                  <a:solidFill>
-                    <a:schemeClr val="bg1"/>
-                  </a:solidFill>
-                  <a:latin typeface="Hiragino Kaku Gothic StdN W8" charset="-128"/>
-                  <a:ea typeface="Hiragino Kaku Gothic StdN W8" charset="-128"/>
-                  <a:cs typeface="Hiragino Kaku Gothic StdN W8" charset="-128"/>
-                </a:rPr>
-                <a:t>14:00-18:00</a:t>
-              </a:r>
-              <a:endParaRPr lang="ja-JP" altLang="en-US" sz="3200" b="1" dirty="0">
-                <a:ln w="15875">
-                  <a:solidFill>
-                    <a:schemeClr val="bg2">
-                      <a:lumMod val="25000"/>
-                    </a:schemeClr>
-                  </a:solidFill>
-                  <a:prstDash val="solid"/>
-                </a:ln>
-                <a:solidFill>
-                  <a:schemeClr val="bg1"/>
-                </a:solidFill>
-                <a:latin typeface="Hiragino Kaku Gothic StdN W8" charset="-128"/>
-                <a:ea typeface="Hiragino Kaku Gothic StdN W8" charset="-128"/>
-                <a:cs typeface="Hiragino Kaku Gothic StdN W8" charset="-128"/>
-              </a:endParaRPr>
-            </a:p>
-          </p:txBody>
-        </p:sp>
-        <p:sp>
-          <p:nvSpPr>
-            <p:cNvPr id="5" name="テキスト ボックス 4"/>
-            <p:cNvSpPr txBox="1"/>
-            <p:nvPr/>
-          </p:nvSpPr>
-          <p:spPr>
-            <a:xfrm>
-              <a:off x="-354912" y="6748612"/>
-              <a:ext cx="9257663" cy="1692771"/>
-            </a:xfrm>
-            <a:prstGeom prst="rect">
-              <a:avLst/>
-            </a:prstGeom>
-            <a:noFill/>
-            <a:ln>
-              <a:noFill/>
-            </a:ln>
-          </p:spPr>
-          <p:txBody>
-            <a:bodyPr wrap="none" rtlCol="0">
-              <a:spAutoFit/>
-            </a:bodyPr>
-            <a:lstStyle/>
-            <a:p>
-              <a:r>
-                <a:rPr lang="ja-JP" altLang="en-US" sz="3200" b="1" dirty="0" smtClean="0">
-                  <a:ln w="15875">
-                    <a:solidFill>
-                      <a:schemeClr val="tx1">
-                        <a:lumMod val="85000"/>
-                        <a:lumOff val="15000"/>
-                      </a:schemeClr>
-                    </a:solidFill>
-                    <a:prstDash val="solid"/>
-                  </a:ln>
-                  <a:solidFill>
-                    <a:schemeClr val="bg1"/>
-                  </a:solidFill>
-                  <a:latin typeface="Hiragino Kaku Gothic StdN W8" charset="-128"/>
-                  <a:ea typeface="Hiragino Kaku Gothic StdN W8" charset="-128"/>
-                  <a:cs typeface="Hiragino Kaku Gothic StdN W8" charset="-128"/>
-                </a:rPr>
-                <a:t>日頃の努力が実る</a:t>
-              </a:r>
-              <a:r>
-                <a:rPr lang="en-US" altLang="ja-JP" sz="3200" b="1" dirty="0" smtClean="0">
-                  <a:ln w="15875">
-                    <a:solidFill>
-                      <a:schemeClr val="tx1">
-                        <a:lumMod val="85000"/>
-                        <a:lumOff val="15000"/>
-                      </a:schemeClr>
-                    </a:solidFill>
-                    <a:prstDash val="solid"/>
-                  </a:ln>
-                  <a:solidFill>
-                    <a:schemeClr val="bg1"/>
-                  </a:solidFill>
-                  <a:latin typeface="Hiragino Kaku Gothic StdN W8" charset="-128"/>
-                  <a:ea typeface="Hiragino Kaku Gothic StdN W8" charset="-128"/>
-                  <a:cs typeface="Hiragino Kaku Gothic StdN W8" charset="-128"/>
-                </a:rPr>
-                <a:t>!?</a:t>
-              </a:r>
-            </a:p>
-            <a:p>
-              <a:r>
-                <a:rPr lang="ja-JP" altLang="en-US" sz="4400" b="1" dirty="0" smtClean="0">
-                  <a:ln w="15875">
-                    <a:solidFill>
-                      <a:schemeClr val="tx1">
-                        <a:lumMod val="85000"/>
-                        <a:lumOff val="15000"/>
-                      </a:schemeClr>
-                    </a:solidFill>
-                    <a:prstDash val="solid"/>
-                  </a:ln>
-                  <a:solidFill>
-                    <a:schemeClr val="bg1"/>
-                  </a:solidFill>
-                  <a:latin typeface="Hiragino Kaku Gothic StdN W8" charset="-128"/>
-                  <a:ea typeface="Hiragino Kaku Gothic StdN W8" charset="-128"/>
-                  <a:cs typeface="Hiragino Kaku Gothic StdN W8" charset="-128"/>
-                </a:rPr>
-                <a:t>上位入賞者には豪華景品</a:t>
-              </a:r>
-              <a:r>
-                <a:rPr lang="en-US" altLang="ja-JP" sz="4400" b="1" dirty="0" smtClean="0">
-                  <a:ln w="15875">
-                    <a:solidFill>
-                      <a:schemeClr val="tx1">
-                        <a:lumMod val="85000"/>
-                        <a:lumOff val="15000"/>
-                      </a:schemeClr>
-                    </a:solidFill>
-                    <a:prstDash val="solid"/>
-                  </a:ln>
-                  <a:solidFill>
-                    <a:schemeClr val="bg1"/>
-                  </a:solidFill>
-                  <a:latin typeface="Hiragino Kaku Gothic StdN W8" charset="-128"/>
-                  <a:ea typeface="Hiragino Kaku Gothic StdN W8" charset="-128"/>
-                  <a:cs typeface="Hiragino Kaku Gothic StdN W8" charset="-128"/>
-                </a:rPr>
-                <a:t>!</a:t>
-              </a:r>
-            </a:p>
-            <a:p>
-              <a:r>
-                <a:rPr lang="ja-JP" altLang="en-US" sz="2800" b="1" dirty="0" smtClean="0">
-                  <a:ln w="15875">
-                    <a:solidFill>
-                      <a:schemeClr val="tx1">
-                        <a:lumMod val="85000"/>
-                        <a:lumOff val="15000"/>
-                      </a:schemeClr>
-                    </a:solidFill>
-                    <a:prstDash val="solid"/>
-                  </a:ln>
-                  <a:solidFill>
-                    <a:schemeClr val="bg1"/>
-                  </a:solidFill>
-                  <a:latin typeface="Hiragino Kaku Gothic StdN W8" charset="-128"/>
-                  <a:ea typeface="Hiragino Kaku Gothic StdN W8" charset="-128"/>
-                  <a:cs typeface="Hiragino Kaku Gothic StdN W8" charset="-128"/>
-                </a:rPr>
-                <a:t>各年次毎に表彰があるので，</a:t>
-              </a:r>
-              <a:r>
-                <a:rPr lang="en-US" altLang="ja-JP" sz="2800" b="1" dirty="0" smtClean="0">
-                  <a:ln w="15875">
-                    <a:solidFill>
-                      <a:schemeClr val="tx1">
-                        <a:lumMod val="85000"/>
-                        <a:lumOff val="15000"/>
-                      </a:schemeClr>
-                    </a:solidFill>
-                    <a:prstDash val="solid"/>
-                  </a:ln>
-                  <a:solidFill>
-                    <a:schemeClr val="bg1"/>
-                  </a:solidFill>
-                  <a:latin typeface="Hiragino Kaku Gothic StdN W8" charset="-128"/>
-                  <a:ea typeface="Hiragino Kaku Gothic StdN W8" charset="-128"/>
-                  <a:cs typeface="Hiragino Kaku Gothic StdN W8" charset="-128"/>
-                </a:rPr>
-                <a:t>1</a:t>
-              </a:r>
-              <a:r>
-                <a:rPr lang="ja-JP" altLang="en-US" sz="2800" b="1" dirty="0" smtClean="0">
-                  <a:ln w="15875">
-                    <a:solidFill>
-                      <a:schemeClr val="tx1">
-                        <a:lumMod val="85000"/>
-                        <a:lumOff val="15000"/>
-                      </a:schemeClr>
-                    </a:solidFill>
-                    <a:prstDash val="solid"/>
-                  </a:ln>
-                  <a:solidFill>
-                    <a:schemeClr val="bg1"/>
-                  </a:solidFill>
-                  <a:latin typeface="Hiragino Kaku Gothic StdN W8" charset="-128"/>
-                  <a:ea typeface="Hiragino Kaku Gothic StdN W8" charset="-128"/>
-                  <a:cs typeface="Hiragino Kaku Gothic StdN W8" charset="-128"/>
-                </a:rPr>
-                <a:t>，</a:t>
-              </a:r>
-              <a:r>
-                <a:rPr lang="en-US" altLang="ja-JP" sz="2800" b="1" dirty="0" smtClean="0">
-                  <a:ln w="15875">
-                    <a:solidFill>
-                      <a:schemeClr val="tx1">
-                        <a:lumMod val="85000"/>
-                        <a:lumOff val="15000"/>
-                      </a:schemeClr>
-                    </a:solidFill>
-                    <a:prstDash val="solid"/>
-                  </a:ln>
-                  <a:solidFill>
-                    <a:schemeClr val="bg1"/>
-                  </a:solidFill>
-                  <a:latin typeface="Hiragino Kaku Gothic StdN W8" charset="-128"/>
-                  <a:ea typeface="Hiragino Kaku Gothic StdN W8" charset="-128"/>
-                  <a:cs typeface="Hiragino Kaku Gothic StdN W8" charset="-128"/>
-                </a:rPr>
-                <a:t>2</a:t>
-              </a:r>
-              <a:r>
-                <a:rPr lang="ja-JP" altLang="en-US" sz="2800" b="1" dirty="0" smtClean="0">
-                  <a:ln w="15875">
-                    <a:solidFill>
-                      <a:schemeClr val="tx1">
-                        <a:lumMod val="85000"/>
-                        <a:lumOff val="15000"/>
-                      </a:schemeClr>
-                    </a:solidFill>
-                    <a:prstDash val="solid"/>
-                  </a:ln>
-                  <a:solidFill>
-                    <a:schemeClr val="bg1"/>
-                  </a:solidFill>
-                  <a:latin typeface="Hiragino Kaku Gothic StdN W8" charset="-128"/>
-                  <a:ea typeface="Hiragino Kaku Gothic StdN W8" charset="-128"/>
-                  <a:cs typeface="Hiragino Kaku Gothic StdN W8" charset="-128"/>
-                </a:rPr>
-                <a:t>年生にもチャンスが</a:t>
-              </a:r>
-              <a:r>
-                <a:rPr lang="en-US" altLang="ja-JP" sz="2800" b="1" dirty="0" smtClean="0">
-                  <a:ln w="15875">
-                    <a:solidFill>
-                      <a:schemeClr val="tx1">
-                        <a:lumMod val="85000"/>
-                        <a:lumOff val="15000"/>
-                      </a:schemeClr>
-                    </a:solidFill>
-                    <a:prstDash val="solid"/>
-                  </a:ln>
-                  <a:solidFill>
-                    <a:schemeClr val="bg1"/>
-                  </a:solidFill>
-                  <a:latin typeface="Hiragino Kaku Gothic StdN W8" charset="-128"/>
-                  <a:ea typeface="Hiragino Kaku Gothic StdN W8" charset="-128"/>
-                  <a:cs typeface="Hiragino Kaku Gothic StdN W8" charset="-128"/>
-                </a:rPr>
-                <a:t>!!</a:t>
-              </a:r>
-              <a:endParaRPr lang="ja-JP" altLang="en-US" sz="2800" b="1" dirty="0">
+              </a:rPr>
+              <a:t>検索</a:t>
+            </a:r>
+            <a:endParaRPr kumimoji="1" lang="ja-JP" altLang="en-US" dirty="0">
+              <a:solidFill>
+                <a:schemeClr val="bg1"/>
+              </a:solidFill>
+              <a:latin typeface="Hiragino Kaku Gothic StdN W8" charset="-128"/>
+              <a:ea typeface="Hiragino Kaku Gothic StdN W8" charset="-128"/>
+              <a:cs typeface="Hiragino Kaku Gothic StdN W8" charset="-128"/>
+            </a:endParaRPr>
+          </a:p>
+        </p:txBody>
+      </p:sp>
+      <p:sp>
+        <p:nvSpPr>
+          <p:cNvPr id="37" name="テキスト ボックス 36"/>
+          <p:cNvSpPr txBox="1"/>
+          <p:nvPr/>
+        </p:nvSpPr>
+        <p:spPr>
+          <a:xfrm>
+            <a:off x="79408" y="7887635"/>
+            <a:ext cx="1620957" cy="523220"/>
+          </a:xfrm>
+          <a:prstGeom prst="rect">
+            <a:avLst/>
+          </a:prstGeom>
+          <a:noFill/>
+        </p:spPr>
+        <p:txBody>
+          <a:bodyPr wrap="none" rtlCol="0">
+            <a:spAutoFit/>
+          </a:bodyPr>
+          <a:lstStyle/>
+          <a:p>
+            <a:r>
+              <a:rPr lang="ja-JP" altLang="en-US" sz="2800" b="1" smtClean="0">
                 <a:ln w="15875">
                   <a:solidFill>
                     <a:schemeClr val="tx1">
@@ -6298,466 +6018,33 @@
                 <a:latin typeface="Hiragino Kaku Gothic StdN W8" charset="-128"/>
                 <a:ea typeface="Hiragino Kaku Gothic StdN W8" charset="-128"/>
                 <a:cs typeface="Hiragino Kaku Gothic StdN W8" charset="-128"/>
-              </a:endParaRPr>
-            </a:p>
-          </p:txBody>
-        </p:sp>
-        <p:sp>
-          <p:nvSpPr>
-            <p:cNvPr id="6" name="円/楕円 5"/>
-            <p:cNvSpPr/>
-            <p:nvPr/>
-          </p:nvSpPr>
-          <p:spPr>
-            <a:xfrm>
-              <a:off x="-2180797" y="4250369"/>
-              <a:ext cx="1825887" cy="1867920"/>
-            </a:xfrm>
-            <a:prstGeom prst="ellipse">
-              <a:avLst/>
-            </a:prstGeom>
-            <a:solidFill>
-              <a:schemeClr val="bg1"/>
-            </a:solidFill>
-            <a:ln w="57150">
+              </a:rPr>
+              <a:t>もしくは</a:t>
+            </a:r>
+            <a:endParaRPr lang="en-US" altLang="ja-JP" sz="2800" b="1" dirty="0" smtClean="0">
+              <a:ln w="15875">
+                <a:solidFill>
+                  <a:schemeClr val="tx1">
+                    <a:lumMod val="85000"/>
+                    <a:lumOff val="15000"/>
+                  </a:schemeClr>
+                </a:solidFill>
+                <a:prstDash val="solid"/>
+              </a:ln>
               <a:solidFill>
-                <a:schemeClr val="bg2">
-                  <a:lumMod val="25000"/>
-                </a:schemeClr>
+                <a:schemeClr val="bg1"/>
               </a:solidFill>
-            </a:ln>
-          </p:spPr>
-          <p:style>
-            <a:lnRef idx="2">
-              <a:schemeClr val="accent1">
-                <a:shade val="50000"/>
-              </a:schemeClr>
-            </a:lnRef>
-            <a:fillRef idx="1">
-              <a:schemeClr val="accent1"/>
-            </a:fillRef>
-            <a:effectRef idx="0">
-              <a:schemeClr val="accent1"/>
-            </a:effectRef>
-            <a:fontRef idx="minor">
-              <a:schemeClr val="lt1"/>
-            </a:fontRef>
-          </p:style>
-          <p:txBody>
-            <a:bodyPr rtlCol="0" anchor="ctr"/>
-            <a:lstStyle/>
-            <a:p>
-              <a:pPr algn="ctr"/>
-              <a:r>
-                <a:rPr kumimoji="1" lang="ja-JP" altLang="en-US" sz="3300" dirty="0" smtClean="0">
-                  <a:solidFill>
-                    <a:schemeClr val="bg2">
-                      <a:lumMod val="25000"/>
-                    </a:schemeClr>
-                  </a:solidFill>
-                  <a:latin typeface="Hiragino Kaku Gothic StdN W8" charset="-128"/>
-                  <a:ea typeface="Hiragino Kaku Gothic StdN W8" charset="-128"/>
-                  <a:cs typeface="Hiragino Kaku Gothic StdN W8" charset="-128"/>
-                </a:rPr>
-                <a:t>日時</a:t>
-              </a:r>
-              <a:endParaRPr kumimoji="1" lang="ja-JP" altLang="en-US" sz="3300" dirty="0">
-                <a:solidFill>
-                  <a:schemeClr val="bg2">
-                    <a:lumMod val="25000"/>
-                  </a:schemeClr>
-                </a:solidFill>
-                <a:latin typeface="Hiragino Kaku Gothic StdN W8" charset="-128"/>
-                <a:ea typeface="Hiragino Kaku Gothic StdN W8" charset="-128"/>
-                <a:cs typeface="Hiragino Kaku Gothic StdN W8" charset="-128"/>
-              </a:endParaRPr>
-            </a:p>
-          </p:txBody>
-        </p:sp>
-        <p:sp>
-          <p:nvSpPr>
-            <p:cNvPr id="7" name="円/楕円 6"/>
-            <p:cNvSpPr/>
-            <p:nvPr/>
-          </p:nvSpPr>
-          <p:spPr>
-            <a:xfrm>
-              <a:off x="-2180797" y="6658168"/>
-              <a:ext cx="1825885" cy="1873661"/>
-            </a:xfrm>
-            <a:prstGeom prst="ellipse">
-              <a:avLst/>
-            </a:prstGeom>
-            <a:solidFill>
-              <a:schemeClr val="bg1"/>
-            </a:solidFill>
-            <a:ln w="57150">
-              <a:solidFill>
-                <a:schemeClr val="bg2">
-                  <a:lumMod val="25000"/>
-                </a:schemeClr>
-              </a:solidFill>
-            </a:ln>
-          </p:spPr>
-          <p:style>
-            <a:lnRef idx="2">
-              <a:schemeClr val="accent1">
-                <a:shade val="50000"/>
-              </a:schemeClr>
-            </a:lnRef>
-            <a:fillRef idx="1">
-              <a:schemeClr val="accent1"/>
-            </a:fillRef>
-            <a:effectRef idx="0">
-              <a:schemeClr val="accent1"/>
-            </a:effectRef>
-            <a:fontRef idx="minor">
-              <a:schemeClr val="lt1"/>
-            </a:fontRef>
-          </p:style>
-          <p:txBody>
-            <a:bodyPr rtlCol="0" anchor="ctr"/>
-            <a:lstStyle/>
-            <a:p>
-              <a:pPr algn="ctr"/>
-              <a:r>
-                <a:rPr kumimoji="1" lang="ja-JP" altLang="en-US" sz="3300" dirty="0" smtClean="0">
-                  <a:solidFill>
-                    <a:schemeClr val="bg2">
-                      <a:lumMod val="25000"/>
-                    </a:schemeClr>
-                  </a:solidFill>
-                  <a:latin typeface="Hiragino Kaku Gothic StdN W8" charset="-128"/>
-                  <a:ea typeface="Hiragino Kaku Gothic StdN W8" charset="-128"/>
-                  <a:cs typeface="Hiragino Kaku Gothic StdN W8" charset="-128"/>
-                </a:rPr>
-                <a:t>景品</a:t>
-              </a:r>
-              <a:endParaRPr kumimoji="1" lang="ja-JP" altLang="en-US" sz="3300" dirty="0">
-                <a:solidFill>
-                  <a:schemeClr val="bg2">
-                    <a:lumMod val="25000"/>
-                  </a:schemeClr>
-                </a:solidFill>
-                <a:latin typeface="Hiragino Kaku Gothic StdN W8" charset="-128"/>
-                <a:ea typeface="Hiragino Kaku Gothic StdN W8" charset="-128"/>
-                <a:cs typeface="Hiragino Kaku Gothic StdN W8" charset="-128"/>
-              </a:endParaRPr>
-            </a:p>
-          </p:txBody>
-        </p:sp>
-        <p:sp>
-          <p:nvSpPr>
-            <p:cNvPr id="8" name="円/楕円 7"/>
-            <p:cNvSpPr/>
-            <p:nvPr/>
-          </p:nvSpPr>
-          <p:spPr>
-            <a:xfrm>
-              <a:off x="-2198131" y="1813526"/>
-              <a:ext cx="1825887" cy="1867920"/>
-            </a:xfrm>
-            <a:prstGeom prst="ellipse">
-              <a:avLst/>
-            </a:prstGeom>
-            <a:solidFill>
-              <a:schemeClr val="bg1"/>
-            </a:solidFill>
-            <a:ln w="57150">
-              <a:solidFill>
-                <a:schemeClr val="bg2">
-                  <a:lumMod val="25000"/>
-                </a:schemeClr>
-              </a:solidFill>
-            </a:ln>
-          </p:spPr>
-          <p:style>
-            <a:lnRef idx="2">
-              <a:schemeClr val="accent1">
-                <a:shade val="50000"/>
-              </a:schemeClr>
-            </a:lnRef>
-            <a:fillRef idx="1">
-              <a:schemeClr val="accent1"/>
-            </a:fillRef>
-            <a:effectRef idx="0">
-              <a:schemeClr val="accent1"/>
-            </a:effectRef>
-            <a:fontRef idx="minor">
-              <a:schemeClr val="lt1"/>
-            </a:fontRef>
-          </p:style>
-          <p:txBody>
-            <a:bodyPr rtlCol="0" anchor="ctr"/>
-            <a:lstStyle/>
-            <a:p>
-              <a:pPr algn="ctr"/>
-              <a:r>
-                <a:rPr kumimoji="1" lang="ja-JP" altLang="en-US" sz="3300" dirty="0" smtClean="0">
-                  <a:solidFill>
-                    <a:schemeClr val="bg2">
-                      <a:lumMod val="25000"/>
-                    </a:schemeClr>
-                  </a:solidFill>
-                  <a:latin typeface="Hiragino Kaku Gothic StdN W8" charset="-128"/>
-                  <a:ea typeface="Hiragino Kaku Gothic StdN W8" charset="-128"/>
-                  <a:cs typeface="Hiragino Kaku Gothic StdN W8" charset="-128"/>
-                </a:rPr>
-                <a:t>概要</a:t>
-              </a:r>
-              <a:endParaRPr kumimoji="1" lang="ja-JP" altLang="en-US" sz="3300" dirty="0">
-                <a:solidFill>
-                  <a:schemeClr val="bg2">
-                    <a:lumMod val="25000"/>
-                  </a:schemeClr>
-                </a:solidFill>
-                <a:latin typeface="Hiragino Kaku Gothic StdN W8" charset="-128"/>
-                <a:ea typeface="Hiragino Kaku Gothic StdN W8" charset="-128"/>
-                <a:cs typeface="Hiragino Kaku Gothic StdN W8" charset="-128"/>
-              </a:endParaRPr>
-            </a:p>
-          </p:txBody>
-        </p:sp>
-        <p:sp>
-          <p:nvSpPr>
-            <p:cNvPr id="9" name="テキスト ボックス 8"/>
-            <p:cNvSpPr txBox="1"/>
-            <p:nvPr/>
-          </p:nvSpPr>
-          <p:spPr>
-            <a:xfrm>
-              <a:off x="-354912" y="1870323"/>
-              <a:ext cx="8818440" cy="1754326"/>
-            </a:xfrm>
-            <a:prstGeom prst="rect">
-              <a:avLst/>
-            </a:prstGeom>
-            <a:noFill/>
-          </p:spPr>
-          <p:txBody>
-            <a:bodyPr wrap="none" rtlCol="0">
-              <a:spAutoFit/>
-            </a:bodyPr>
-            <a:lstStyle/>
-            <a:p>
-              <a:r>
-                <a:rPr lang="ja-JP" altLang="en-US" sz="3200" b="1" dirty="0" smtClean="0">
-                  <a:ln w="15875">
-                    <a:solidFill>
-                      <a:schemeClr val="bg2">
-                        <a:lumMod val="25000"/>
-                      </a:schemeClr>
-                    </a:solidFill>
-                    <a:prstDash val="solid"/>
-                  </a:ln>
-                  <a:solidFill>
-                    <a:schemeClr val="bg1"/>
-                  </a:solidFill>
-                  <a:latin typeface="Hiragino Kaku Gothic StdN W8" charset="-128"/>
-                  <a:ea typeface="Hiragino Kaku Gothic StdN W8" charset="-128"/>
-                  <a:cs typeface="Hiragino Kaku Gothic StdN W8" charset="-128"/>
-                </a:rPr>
-                <a:t>京都産業大学生</a:t>
-              </a:r>
-              <a:r>
-                <a:rPr lang="en-US" altLang="ja-JP" sz="3200" b="1" dirty="0" smtClean="0">
-                  <a:ln w="15875">
-                    <a:solidFill>
-                      <a:schemeClr val="bg2">
-                        <a:lumMod val="25000"/>
-                      </a:schemeClr>
-                    </a:solidFill>
-                    <a:prstDash val="solid"/>
-                  </a:ln>
-                  <a:solidFill>
-                    <a:schemeClr val="bg1"/>
-                  </a:solidFill>
-                  <a:latin typeface="Hiragino Kaku Gothic StdN W8" charset="-128"/>
-                  <a:ea typeface="Hiragino Kaku Gothic StdN W8" charset="-128"/>
-                  <a:cs typeface="Hiragino Kaku Gothic StdN W8" charset="-128"/>
-                </a:rPr>
-                <a:t> </a:t>
-              </a:r>
-              <a:r>
-                <a:rPr lang="ja-JP" altLang="en-US" sz="3200" b="1" dirty="0" smtClean="0">
-                  <a:ln w="15875">
-                    <a:solidFill>
-                      <a:schemeClr val="bg2">
-                        <a:lumMod val="25000"/>
-                      </a:schemeClr>
-                    </a:solidFill>
-                    <a:prstDash val="solid"/>
-                  </a:ln>
-                  <a:solidFill>
-                    <a:schemeClr val="bg1"/>
-                  </a:solidFill>
-                  <a:latin typeface="Hiragino Kaku Gothic StdN W8" charset="-128"/>
-                  <a:ea typeface="Hiragino Kaku Gothic StdN W8" charset="-128"/>
-                  <a:cs typeface="Hiragino Kaku Gothic StdN W8" charset="-128"/>
-                </a:rPr>
-                <a:t>限定</a:t>
-              </a:r>
-              <a:r>
-                <a:rPr lang="en-US" altLang="ja-JP" sz="3200" b="1" dirty="0" smtClean="0">
-                  <a:ln w="15875">
-                    <a:solidFill>
-                      <a:schemeClr val="bg2">
-                        <a:lumMod val="25000"/>
-                      </a:schemeClr>
-                    </a:solidFill>
-                    <a:prstDash val="solid"/>
-                  </a:ln>
-                  <a:solidFill>
-                    <a:schemeClr val="bg1"/>
-                  </a:solidFill>
-                  <a:latin typeface="Hiragino Kaku Gothic StdN W8" charset="-128"/>
-                  <a:ea typeface="Hiragino Kaku Gothic StdN W8" charset="-128"/>
-                  <a:cs typeface="Hiragino Kaku Gothic StdN W8" charset="-128"/>
-                </a:rPr>
-                <a:t>!</a:t>
-              </a:r>
-            </a:p>
-            <a:p>
-              <a:r>
-                <a:rPr lang="ja-JP" altLang="en-US" sz="3200" b="1" dirty="0" smtClean="0">
-                  <a:ln w="15875">
-                    <a:solidFill>
-                      <a:schemeClr val="bg2">
-                        <a:lumMod val="25000"/>
-                      </a:schemeClr>
-                    </a:solidFill>
-                    <a:prstDash val="solid"/>
-                  </a:ln>
-                  <a:solidFill>
-                    <a:schemeClr val="bg1"/>
-                  </a:solidFill>
-                  <a:latin typeface="Hiragino Kaku Gothic StdN W8" charset="-128"/>
-                  <a:ea typeface="Hiragino Kaku Gothic StdN W8" charset="-128"/>
-                  <a:cs typeface="Hiragino Kaku Gothic StdN W8" charset="-128"/>
-                </a:rPr>
-                <a:t>第５回</a:t>
-              </a:r>
-              <a:r>
-                <a:rPr lang="ja-JP" altLang="en-US" sz="4400" b="1" dirty="0" smtClean="0">
-                  <a:ln w="15875">
-                    <a:solidFill>
-                      <a:schemeClr val="bg2">
-                        <a:lumMod val="25000"/>
-                      </a:schemeClr>
-                    </a:solidFill>
-                    <a:prstDash val="solid"/>
-                  </a:ln>
-                  <a:solidFill>
-                    <a:schemeClr val="bg1"/>
-                  </a:solidFill>
-                  <a:latin typeface="Hiragino Kaku Gothic StdN W8" charset="-128"/>
-                  <a:ea typeface="Hiragino Kaku Gothic StdN W8" charset="-128"/>
-                  <a:cs typeface="Hiragino Kaku Gothic StdN W8" charset="-128"/>
-                </a:rPr>
-                <a:t>競技プログラミング大会</a:t>
-              </a:r>
-              <a:r>
-                <a:rPr lang="ja-JP" altLang="en-US" sz="3200" b="1" dirty="0" smtClean="0">
-                  <a:ln w="15875">
-                    <a:solidFill>
-                      <a:schemeClr val="bg2">
-                        <a:lumMod val="25000"/>
-                      </a:schemeClr>
-                    </a:solidFill>
-                    <a:prstDash val="solid"/>
-                  </a:ln>
-                  <a:solidFill>
-                    <a:schemeClr val="bg1"/>
-                  </a:solidFill>
-                  <a:latin typeface="Hiragino Kaku Gothic StdN W8" charset="-128"/>
-                  <a:ea typeface="Hiragino Kaku Gothic StdN W8" charset="-128"/>
-                  <a:cs typeface="Hiragino Kaku Gothic StdN W8" charset="-128"/>
-                </a:rPr>
-                <a:t>開催</a:t>
-              </a:r>
-              <a:r>
-                <a:rPr lang="en-US" altLang="ja-JP" sz="3200" b="1" dirty="0" smtClean="0">
-                  <a:ln w="15875">
-                    <a:solidFill>
-                      <a:schemeClr val="bg2">
-                        <a:lumMod val="25000"/>
-                      </a:schemeClr>
-                    </a:solidFill>
-                    <a:prstDash val="solid"/>
-                  </a:ln>
-                  <a:solidFill>
-                    <a:schemeClr val="bg1"/>
-                  </a:solidFill>
-                  <a:latin typeface="Hiragino Kaku Gothic StdN W8" charset="-128"/>
-                  <a:ea typeface="Hiragino Kaku Gothic StdN W8" charset="-128"/>
-                  <a:cs typeface="Hiragino Kaku Gothic StdN W8" charset="-128"/>
-                </a:rPr>
-                <a:t>!</a:t>
-              </a:r>
-            </a:p>
-            <a:p>
-              <a:r>
-                <a:rPr lang="ja-JP" altLang="en-US" sz="3200" b="1" dirty="0" smtClean="0">
-                  <a:ln w="15875">
-                    <a:solidFill>
-                      <a:schemeClr val="bg2">
-                        <a:lumMod val="25000"/>
-                      </a:schemeClr>
-                    </a:solidFill>
-                    <a:prstDash val="solid"/>
-                  </a:ln>
-                  <a:solidFill>
-                    <a:schemeClr val="bg1"/>
-                  </a:solidFill>
-                  <a:latin typeface="Hiragino Kaku Gothic StdN W8" charset="-128"/>
-                  <a:ea typeface="Hiragino Kaku Gothic StdN W8" charset="-128"/>
-                  <a:cs typeface="Hiragino Kaku Gothic StdN W8" charset="-128"/>
-                </a:rPr>
-                <a:t>京都産業大学一の競技プログラマは貴方かも</a:t>
-              </a:r>
-              <a:r>
-                <a:rPr lang="en-US" altLang="ja-JP" sz="3200" b="1" dirty="0" smtClean="0">
-                  <a:ln w="15875">
-                    <a:solidFill>
-                      <a:schemeClr val="bg2">
-                        <a:lumMod val="25000"/>
-                      </a:schemeClr>
-                    </a:solidFill>
-                    <a:prstDash val="solid"/>
-                  </a:ln>
-                  <a:solidFill>
-                    <a:schemeClr val="bg1"/>
-                  </a:solidFill>
-                  <a:latin typeface="Hiragino Kaku Gothic StdN W8" charset="-128"/>
-                  <a:ea typeface="Hiragino Kaku Gothic StdN W8" charset="-128"/>
-                  <a:cs typeface="Hiragino Kaku Gothic StdN W8" charset="-128"/>
-                </a:rPr>
-                <a:t>!?</a:t>
-              </a:r>
-              <a:endParaRPr lang="ja-JP" altLang="en-US" sz="3200" b="1" dirty="0">
-                <a:ln w="15875">
-                  <a:solidFill>
-                    <a:schemeClr val="bg2">
-                      <a:lumMod val="25000"/>
-                    </a:schemeClr>
-                  </a:solidFill>
-                  <a:prstDash val="solid"/>
-                </a:ln>
-                <a:solidFill>
-                  <a:schemeClr val="bg1"/>
-                </a:solidFill>
-                <a:latin typeface="Hiragino Kaku Gothic StdN W8" charset="-128"/>
-                <a:ea typeface="Hiragino Kaku Gothic StdN W8" charset="-128"/>
-                <a:cs typeface="Hiragino Kaku Gothic StdN W8" charset="-128"/>
-              </a:endParaRPr>
-            </a:p>
-          </p:txBody>
-        </p:sp>
-      </p:grpSp>
+              <a:latin typeface="Hiragino Kaku Gothic StdN W8" charset="-128"/>
+              <a:ea typeface="Hiragino Kaku Gothic StdN W8" charset="-128"/>
+              <a:cs typeface="Hiragino Kaku Gothic StdN W8" charset="-128"/>
+            </a:endParaRPr>
+          </a:p>
+        </p:txBody>
+      </p:sp>
     </p:spTree>
     <p:extLst>
       <p:ext uri="{BB962C8B-B14F-4D97-AF65-F5344CB8AC3E}">
-        <p14:creationId xmlns:p14="http://schemas.microsoft.com/office/powerpoint/2010/main" val="690791379"/>
+        <p14:creationId xmlns:p14="http://schemas.microsoft.com/office/powerpoint/2010/main" val="1364431154"/>
       </p:ext>
     </p:extLst>
   </p:cSld>

</xml_diff>